<commit_message>
Dec 16th : Satoshi +1day version
</commit_message>
<xml_diff>
--- a/images/smallmutiples.pptx
+++ b/images/smallmutiples.pptx
@@ -6,6 +6,7 @@
   </p:sldMasterIdLst>
   <p:sldIdLst>
     <p:sldId id="256" r:id="rId2"/>
+    <p:sldId id="257" r:id="rId3"/>
   </p:sldIdLst>
   <p:sldSz cx="9144000" cy="6858000" type="screen4x3"/>
   <p:notesSz cx="6858000" cy="9144000"/>
@@ -285,7 +286,7 @@
           <a:lstStyle/>
           <a:p>
             <a:fld id="{03EE9C12-C9F1-C44F-93FF-E87C755F8C5F}" type="datetimeFigureOut">
-              <a:t>08/11/2016</a:t>
+              <a:t>15/12/2016</a:t>
             </a:fld>
             <a:endParaRPr lang="fr-FR"/>
           </a:p>
@@ -451,7 +452,7 @@
           <a:lstStyle/>
           <a:p>
             <a:fld id="{03EE9C12-C9F1-C44F-93FF-E87C755F8C5F}" type="datetimeFigureOut">
-              <a:t>08/11/2016</a:t>
+              <a:t>15/12/2016</a:t>
             </a:fld>
             <a:endParaRPr lang="fr-FR"/>
           </a:p>
@@ -627,7 +628,7 @@
           <a:lstStyle/>
           <a:p>
             <a:fld id="{03EE9C12-C9F1-C44F-93FF-E87C755F8C5F}" type="datetimeFigureOut">
-              <a:t>08/11/2016</a:t>
+              <a:t>15/12/2016</a:t>
             </a:fld>
             <a:endParaRPr lang="fr-FR"/>
           </a:p>
@@ -793,7 +794,7 @@
           <a:lstStyle/>
           <a:p>
             <a:fld id="{03EE9C12-C9F1-C44F-93FF-E87C755F8C5F}" type="datetimeFigureOut">
-              <a:t>08/11/2016</a:t>
+              <a:t>15/12/2016</a:t>
             </a:fld>
             <a:endParaRPr lang="fr-FR"/>
           </a:p>
@@ -1036,7 +1037,7 @@
           <a:lstStyle/>
           <a:p>
             <a:fld id="{03EE9C12-C9F1-C44F-93FF-E87C755F8C5F}" type="datetimeFigureOut">
-              <a:t>08/11/2016</a:t>
+              <a:t>15/12/2016</a:t>
             </a:fld>
             <a:endParaRPr lang="fr-FR"/>
           </a:p>
@@ -1319,7 +1320,7 @@
           <a:lstStyle/>
           <a:p>
             <a:fld id="{03EE9C12-C9F1-C44F-93FF-E87C755F8C5F}" type="datetimeFigureOut">
-              <a:t>08/11/2016</a:t>
+              <a:t>15/12/2016</a:t>
             </a:fld>
             <a:endParaRPr lang="fr-FR"/>
           </a:p>
@@ -1736,7 +1737,7 @@
           <a:lstStyle/>
           <a:p>
             <a:fld id="{03EE9C12-C9F1-C44F-93FF-E87C755F8C5F}" type="datetimeFigureOut">
-              <a:t>08/11/2016</a:t>
+              <a:t>15/12/2016</a:t>
             </a:fld>
             <a:endParaRPr lang="fr-FR"/>
           </a:p>
@@ -1851,7 +1852,7 @@
           <a:lstStyle/>
           <a:p>
             <a:fld id="{03EE9C12-C9F1-C44F-93FF-E87C755F8C5F}" type="datetimeFigureOut">
-              <a:t>08/11/2016</a:t>
+              <a:t>15/12/2016</a:t>
             </a:fld>
             <a:endParaRPr lang="fr-FR"/>
           </a:p>
@@ -1944,7 +1945,7 @@
           <a:lstStyle/>
           <a:p>
             <a:fld id="{03EE9C12-C9F1-C44F-93FF-E87C755F8C5F}" type="datetimeFigureOut">
-              <a:t>08/11/2016</a:t>
+              <a:t>15/12/2016</a:t>
             </a:fld>
             <a:endParaRPr lang="fr-FR"/>
           </a:p>
@@ -2217,7 +2218,7 @@
           <a:lstStyle/>
           <a:p>
             <a:fld id="{03EE9C12-C9F1-C44F-93FF-E87C755F8C5F}" type="datetimeFigureOut">
-              <a:t>08/11/2016</a:t>
+              <a:t>15/12/2016</a:t>
             </a:fld>
             <a:endParaRPr lang="fr-FR"/>
           </a:p>
@@ -2467,7 +2468,7 @@
           <a:lstStyle/>
           <a:p>
             <a:fld id="{03EE9C12-C9F1-C44F-93FF-E87C755F8C5F}" type="datetimeFigureOut">
-              <a:t>08/11/2016</a:t>
+              <a:t>15/12/2016</a:t>
             </a:fld>
             <a:endParaRPr lang="fr-FR"/>
           </a:p>
@@ -2676,7 +2677,7 @@
           </a:lstStyle>
           <a:p>
             <a:fld id="{03EE9C12-C9F1-C44F-93FF-E87C755F8C5F}" type="datetimeFigureOut">
-              <a:t>08/11/2016</a:t>
+              <a:t>15/12/2016</a:t>
             </a:fld>
             <a:endParaRPr lang="fr-FR"/>
           </a:p>
@@ -3198,6 +3199,94 @@
     <p:extLst>
       <p:ext uri="{BB962C8B-B14F-4D97-AF65-F5344CB8AC3E}">
         <p14:creationId xmlns:p14="http://schemas.microsoft.com/office/powerpoint/2010/main" val="2449275934"/>
+      </p:ext>
+    </p:extLst>
+  </p:cSld>
+  <p:clrMapOvr>
+    <a:masterClrMapping/>
+  </p:clrMapOvr>
+</p:sld>
+</file>
+
+<file path=ppt/slides/slide2.xml><?xml version="1.0" encoding="utf-8"?>
+<p:sld xmlns:a="http://schemas.openxmlformats.org/drawingml/2006/main" xmlns:r="http://schemas.openxmlformats.org/officeDocument/2006/relationships" xmlns:p="http://schemas.openxmlformats.org/presentationml/2006/main">
+  <p:cSld>
+    <p:spTree>
+      <p:nvGrpSpPr>
+        <p:cNvPr id="1" name=""/>
+        <p:cNvGrpSpPr/>
+        <p:nvPr/>
+      </p:nvGrpSpPr>
+      <p:grpSpPr>
+        <a:xfrm>
+          <a:off x="0" y="0"/>
+          <a:ext cx="0" cy="0"/>
+          <a:chOff x="0" y="0"/>
+          <a:chExt cx="0" cy="0"/>
+        </a:xfrm>
+      </p:grpSpPr>
+      <p:pic>
+        <p:nvPicPr>
+          <p:cNvPr id="4" name="Image 3" descr="Capture d’écran 2016-12-15 à 15.55.17.png"/>
+          <p:cNvPicPr>
+            <a:picLocks noChangeAspect="1"/>
+          </p:cNvPicPr>
+          <p:nvPr/>
+        </p:nvPicPr>
+        <p:blipFill rotWithShape="1">
+          <a:blip r:embed="rId2">
+            <a:extLst>
+              <a:ext uri="{28A0092B-C50C-407E-A947-70E740481C1C}">
+                <a14:useLocalDpi xmlns:a14="http://schemas.microsoft.com/office/drawing/2010/main" val="0"/>
+              </a:ext>
+            </a:extLst>
+          </a:blip>
+          <a:srcRect l="-2709"/>
+          <a:stretch/>
+        </p:blipFill>
+        <p:spPr>
+          <a:xfrm rot="235766">
+            <a:off x="-372131" y="1523428"/>
+            <a:ext cx="4942182" cy="3789284"/>
+          </a:xfrm>
+          <a:prstGeom prst="rect">
+            <a:avLst/>
+          </a:prstGeom>
+        </p:spPr>
+      </p:pic>
+      <p:pic>
+        <p:nvPicPr>
+          <p:cNvPr id="5" name="Image 4" descr="Capture d’écran 2016-12-15 à 15.55.27.png"/>
+          <p:cNvPicPr>
+            <a:picLocks noChangeAspect="1"/>
+          </p:cNvPicPr>
+          <p:nvPr/>
+        </p:nvPicPr>
+        <p:blipFill rotWithShape="1">
+          <a:blip r:embed="rId3">
+            <a:extLst>
+              <a:ext uri="{28A0092B-C50C-407E-A947-70E740481C1C}">
+                <a14:useLocalDpi xmlns:a14="http://schemas.microsoft.com/office/drawing/2010/main" val="0"/>
+              </a:ext>
+            </a:extLst>
+          </a:blip>
+          <a:srcRect l="7422" t="4574"/>
+          <a:stretch/>
+        </p:blipFill>
+        <p:spPr>
+          <a:xfrm rot="255479">
+            <a:off x="4392405" y="2261813"/>
+            <a:ext cx="4110772" cy="3289425"/>
+          </a:xfrm>
+          <a:prstGeom prst="rect">
+            <a:avLst/>
+          </a:prstGeom>
+        </p:spPr>
+      </p:pic>
+    </p:spTree>
+    <p:extLst>
+      <p:ext uri="{BB962C8B-B14F-4D97-AF65-F5344CB8AC3E}">
+        <p14:creationId xmlns:p14="http://schemas.microsoft.com/office/powerpoint/2010/main" val="1223775297"/>
       </p:ext>
     </p:extLst>
   </p:cSld>

</xml_diff>